<commit_message>
Revert "Revert "Minor changes""
This reverts commit c1e2f9a50ff60d7a117b3e06a5ffeb359b239618.
</commit_message>
<xml_diff>
--- a/disc02/disc02.pptx
+++ b/disc02/disc02.pptx
@@ -2170,7 +2170,7 @@
           </a:ln>
           <a:extLst>
             <a:ext uri="{C572A759-6A51-4108-AA02-DFA0A04FC94B}">
-              <ma14:wrappingTextBoxFlag xmlns="" xmlns:m="http://schemas.openxmlformats.org/officeDocument/2006/math" xmlns:a14="http://schemas.microsoft.com/office/drawing/2010/main" xmlns:ma14="http://schemas.microsoft.com/office/mac/drawingml/2011/main" val="1"/>
+              <ma14:wrappingTextBoxFlag xmlns:ma14="http://schemas.microsoft.com/office/mac/drawingml/2011/main" xmlns:a14="http://schemas.microsoft.com/office/drawing/2010/main" xmlns:m="http://schemas.openxmlformats.org/officeDocument/2006/math" xmlns="" val="1"/>
             </a:ext>
           </a:extLst>
         </p:spPr>
@@ -2209,7 +2209,7 @@
           </a:ln>
           <a:extLst>
             <a:ext uri="{C572A759-6A51-4108-AA02-DFA0A04FC94B}">
-              <ma14:wrappingTextBoxFlag xmlns="" xmlns:m="http://schemas.openxmlformats.org/officeDocument/2006/math" xmlns:a14="http://schemas.microsoft.com/office/drawing/2010/main" xmlns:ma14="http://schemas.microsoft.com/office/mac/drawingml/2011/main" val="1"/>
+              <ma14:wrappingTextBoxFlag xmlns:ma14="http://schemas.microsoft.com/office/mac/drawingml/2011/main" xmlns:a14="http://schemas.microsoft.com/office/drawing/2010/main" xmlns:m="http://schemas.openxmlformats.org/officeDocument/2006/math" xmlns="" val="1"/>
             </a:ext>
           </a:extLst>
         </p:spPr>
@@ -3135,7 +3135,7 @@
           </a:ln>
           <a:extLst>
             <a:ext uri="{C572A759-6A51-4108-AA02-DFA0A04FC94B}">
-              <ma14:wrappingTextBoxFlag xmlns="" xmlns:m="http://schemas.openxmlformats.org/officeDocument/2006/math" xmlns:a14="http://schemas.microsoft.com/office/drawing/2010/main" xmlns:ma14="http://schemas.microsoft.com/office/mac/drawingml/2011/main" val="1"/>
+              <ma14:wrappingTextBoxFlag xmlns:ma14="http://schemas.microsoft.com/office/mac/drawingml/2011/main" xmlns:a14="http://schemas.microsoft.com/office/drawing/2010/main" xmlns:m="http://schemas.openxmlformats.org/officeDocument/2006/math" xmlns="" val="1"/>
             </a:ext>
           </a:extLst>
         </p:spPr>
@@ -3152,8 +3152,12 @@
               <a:defRPr sz="3600"/>
             </a:pPr>
             <a:r>
+              <a:rPr lang="en-IN" dirty="0"/>
+              <a:t>Today’s </a:t>
+            </a:r>
+            <a:r>
               <a:rPr dirty="0"/>
-              <a:t>Learning goals:</a:t>
+              <a:t>goals:</a:t>
             </a:r>
           </a:p>
           <a:p>
@@ -3165,10 +3169,37 @@
               <a:buChar char="•"/>
               <a:defRPr sz="3600"/>
             </a:pPr>
-            <a:r>
-              <a:rPr dirty="0"/>
+            <a:endParaRPr lang="en-IN" dirty="0"/>
+          </a:p>
+          <a:p>
+            <a:pPr marL="714375" indent="-714375">
+              <a:spcBef>
+                <a:spcPts val="0"/>
+              </a:spcBef>
+              <a:buSzPct val="125000"/>
+              <a:buChar char="•"/>
+              <a:defRPr sz="3600"/>
+            </a:pPr>
+            <a:r>
+              <a:rPr lang="en-IN" dirty="0"/>
+              <a:t>Finding group members for project</a:t>
+            </a:r>
+          </a:p>
+          <a:p>
+            <a:pPr marL="714375" indent="-714375">
+              <a:spcBef>
+                <a:spcPts val="0"/>
+              </a:spcBef>
+              <a:buSzPct val="125000"/>
+              <a:buFontTx/>
+              <a:buChar char="•"/>
+              <a:defRPr sz="3600"/>
+            </a:pPr>
+            <a:r>
+              <a:rPr lang="en-IN" dirty="0"/>
               <a:t>Check your work for the GitHub portion of A1.</a:t>
             </a:r>
+            <a:endParaRPr dirty="0"/>
           </a:p>
           <a:p>
             <a:pPr marL="714375" indent="-714375">
@@ -3271,7 +3302,7 @@
           </a:ln>
           <a:extLst>
             <a:ext uri="{C572A759-6A51-4108-AA02-DFA0A04FC94B}">
-              <ma14:wrappingTextBoxFlag xmlns="" xmlns:m="http://schemas.openxmlformats.org/officeDocument/2006/math" xmlns:a14="http://schemas.microsoft.com/office/drawing/2010/main" xmlns:ma14="http://schemas.microsoft.com/office/mac/drawingml/2011/main" val="1"/>
+              <ma14:wrappingTextBoxFlag xmlns:ma14="http://schemas.microsoft.com/office/mac/drawingml/2011/main" xmlns:a14="http://schemas.microsoft.com/office/drawing/2010/main" xmlns:m="http://schemas.openxmlformats.org/officeDocument/2006/math" xmlns="" val="1"/>
             </a:ext>
           </a:extLst>
         </p:spPr>
@@ -5487,7 +5518,28 @@
           <a:lstStyle/>
           <a:p>
             <a:r>
-              <a:t>We fetched assignments from datahub and started work on A1</a:t>
+              <a:rPr lang="en-IN" dirty="0"/>
+              <a:t>Installed Git, Anaconda</a:t>
+            </a:r>
+          </a:p>
+          <a:p>
+            <a:r>
+              <a:rPr lang="en-IN" dirty="0"/>
+              <a:t>Got familiar with </a:t>
+            </a:r>
+            <a:r>
+              <a:rPr lang="en-IN" dirty="0" err="1"/>
+              <a:t>Jupyter</a:t>
+            </a:r>
+            <a:r>
+              <a:rPr lang="en-IN" dirty="0"/>
+              <a:t> notebooks</a:t>
+            </a:r>
+          </a:p>
+          <a:p>
+            <a:r>
+              <a:rPr lang="en-IN" dirty="0"/>
+              <a:t>Learned how to fetch assignments from datahub and started work on A1</a:t>
             </a:r>
           </a:p>
         </p:txBody>
@@ -5556,12 +5608,18 @@
           </p:nvPr>
         </p:nvSpPr>
         <p:spPr>
+          <a:xfrm>
+            <a:off x="1689100" y="3751766"/>
+            <a:ext cx="21005800" cy="9296400"/>
+          </a:xfrm>
           <a:prstGeom prst="rect">
             <a:avLst/>
           </a:prstGeom>
         </p:spPr>
         <p:txBody>
-          <a:bodyPr/>
+          <a:bodyPr>
+            <a:normAutofit/>
+          </a:bodyPr>
           <a:lstStyle/>
           <a:p>
             <a:r>
@@ -5572,14 +5630,43 @@
           <a:p>
             <a:r>
               <a:rPr lang="en-IN" dirty="0"/>
-              <a:t>If you haven’t found a team mate, this is the perfect time to begin (Use Piazza as well!!)</a:t>
+              <a:t>Discussion sections are the only place you interact with you classmates. (Use Piazza as well!!)</a:t>
             </a:r>
           </a:p>
           <a:p>
             <a:r>
               <a:rPr lang="en-IN" dirty="0"/>
-              <a:t>Project Proposals are due next week</a:t>
-            </a:r>
+              <a:t>Project Proposals are due next week (10/23) – Proposal will take time!</a:t>
+            </a:r>
+          </a:p>
+          <a:p>
+            <a:pPr lvl="1"/>
+            <a:r>
+              <a:rPr lang="en-IN" sz="4100" b="0" dirty="0"/>
+              <a:t>Research Problem</a:t>
+            </a:r>
+          </a:p>
+          <a:p>
+            <a:pPr lvl="1"/>
+            <a:r>
+              <a:rPr lang="en-IN" sz="4100" b="0" dirty="0"/>
+              <a:t>Datasets</a:t>
+            </a:r>
+          </a:p>
+          <a:p>
+            <a:pPr lvl="1"/>
+            <a:r>
+              <a:rPr lang="en-IN" sz="4100" b="0" dirty="0"/>
+              <a:t>Prior Work</a:t>
+            </a:r>
+          </a:p>
+          <a:p>
+            <a:pPr lvl="1"/>
+            <a:r>
+              <a:rPr lang="en-IN" sz="4100" b="0" dirty="0"/>
+              <a:t>Hypothesis</a:t>
+            </a:r>
+            <a:endParaRPr lang="en-IN" b="0" dirty="0"/>
           </a:p>
           <a:p>
             <a:endParaRPr dirty="0"/>
@@ -5720,7 +5807,7 @@
           </a:ln>
           <a:extLst>
             <a:ext uri="{C572A759-6A51-4108-AA02-DFA0A04FC94B}">
-              <ma14:wrappingTextBoxFlag xmlns="" xmlns:m="http://schemas.openxmlformats.org/officeDocument/2006/math" xmlns:a14="http://schemas.microsoft.com/office/drawing/2010/main" xmlns:ma14="http://schemas.microsoft.com/office/mac/drawingml/2011/main" val="1"/>
+              <ma14:wrappingTextBoxFlag xmlns:ma14="http://schemas.microsoft.com/office/mac/drawingml/2011/main" xmlns:a14="http://schemas.microsoft.com/office/drawing/2010/main" xmlns:m="http://schemas.openxmlformats.org/officeDocument/2006/math" xmlns="" val="1"/>
             </a:ext>
           </a:extLst>
         </p:spPr>
@@ -5771,7 +5858,7 @@
           </a:ln>
           <a:extLst>
             <a:ext uri="{C572A759-6A51-4108-AA02-DFA0A04FC94B}">
-              <ma14:wrappingTextBoxFlag xmlns="" xmlns:m="http://schemas.openxmlformats.org/officeDocument/2006/math" xmlns:a14="http://schemas.microsoft.com/office/drawing/2010/main" xmlns:ma14="http://schemas.microsoft.com/office/mac/drawingml/2011/main" val="1"/>
+              <ma14:wrappingTextBoxFlag xmlns:ma14="http://schemas.microsoft.com/office/mac/drawingml/2011/main" xmlns:a14="http://schemas.microsoft.com/office/drawing/2010/main" xmlns:m="http://schemas.openxmlformats.org/officeDocument/2006/math" xmlns="" val="1"/>
             </a:ext>
           </a:extLst>
         </p:spPr>
@@ -5824,7 +5911,7 @@
           </a:ln>
           <a:extLst>
             <a:ext uri="{C572A759-6A51-4108-AA02-DFA0A04FC94B}">
-              <ma14:wrappingTextBoxFlag xmlns="" xmlns:m="http://schemas.openxmlformats.org/officeDocument/2006/math" xmlns:a14="http://schemas.microsoft.com/office/drawing/2010/main" xmlns:ma14="http://schemas.microsoft.com/office/mac/drawingml/2011/main" val="1"/>
+              <ma14:wrappingTextBoxFlag xmlns:ma14="http://schemas.microsoft.com/office/mac/drawingml/2011/main" xmlns:a14="http://schemas.microsoft.com/office/drawing/2010/main" xmlns:m="http://schemas.openxmlformats.org/officeDocument/2006/math" xmlns="" val="1"/>
             </a:ext>
           </a:extLst>
         </p:spPr>
@@ -5965,7 +6052,7 @@
           </a:ln>
           <a:extLst>
             <a:ext uri="{C572A759-6A51-4108-AA02-DFA0A04FC94B}">
-              <ma14:wrappingTextBoxFlag xmlns="" xmlns:m="http://schemas.openxmlformats.org/officeDocument/2006/math" xmlns:a14="http://schemas.microsoft.com/office/drawing/2010/main" xmlns:ma14="http://schemas.microsoft.com/office/mac/drawingml/2011/main" val="1"/>
+              <ma14:wrappingTextBoxFlag xmlns:ma14="http://schemas.microsoft.com/office/mac/drawingml/2011/main" xmlns:a14="http://schemas.microsoft.com/office/drawing/2010/main" xmlns:m="http://schemas.openxmlformats.org/officeDocument/2006/math" xmlns="" val="1"/>
             </a:ext>
           </a:extLst>
         </p:spPr>
@@ -6102,7 +6189,7 @@
           </a:ln>
           <a:extLst>
             <a:ext uri="{C572A759-6A51-4108-AA02-DFA0A04FC94B}">
-              <ma14:wrappingTextBoxFlag xmlns="" xmlns:m="http://schemas.openxmlformats.org/officeDocument/2006/math" xmlns:a14="http://schemas.microsoft.com/office/drawing/2010/main" xmlns:ma14="http://schemas.microsoft.com/office/mac/drawingml/2011/main" val="1"/>
+              <ma14:wrappingTextBoxFlag xmlns:ma14="http://schemas.microsoft.com/office/mac/drawingml/2011/main" xmlns:a14="http://schemas.microsoft.com/office/drawing/2010/main" xmlns:m="http://schemas.openxmlformats.org/officeDocument/2006/math" xmlns="" val="1"/>
             </a:ext>
           </a:extLst>
         </p:spPr>
@@ -6801,24 +6888,8 @@
               </a:spcBef>
             </a:pPr>
             <a:r>
-              <a:rPr dirty="0"/>
-              <a:t>Complete walkthrough of Part</a:t>
-            </a:r>
-            <a:r>
-              <a:rPr lang="en-IN" dirty="0"/>
-              <a:t>. (Go through all Questions of Part 1)</a:t>
-            </a:r>
-            <a:endParaRPr dirty="0"/>
-          </a:p>
-          <a:p>
-            <a:pPr marL="1349375" lvl="1">
-              <a:spcBef>
-                <a:spcPts val="2700"/>
-              </a:spcBef>
-            </a:pPr>
-            <a:r>
-              <a:rPr dirty="0"/>
-              <a:t>I’m going to do this quickly, so you have to do it yourself</a:t>
+              <a:rPr lang="en-US" dirty="0"/>
+              <a:t>Based on the polls, we will use demo.</a:t>
             </a:r>
           </a:p>
           <a:p>
@@ -6828,8 +6899,8 @@
               </a:spcBef>
             </a:pPr>
             <a:r>
-              <a:rPr dirty="0"/>
-              <a:t>I’ll also show you how to check your work.</a:t>
+              <a:rPr lang="en-US" dirty="0"/>
+              <a:t>Questions regarding the Git part?</a:t>
             </a:r>
           </a:p>
         </p:txBody>
@@ -6918,26 +6989,8 @@
                                   </p:childTnLst>
                                 </p:cTn>
                               </p:par>
-                            </p:childTnLst>
-                          </p:cTn>
-                        </p:par>
-                      </p:childTnLst>
-                    </p:cTn>
-                  </p:par>
-                  <p:par>
-                    <p:cTn id="9" fill="hold">
-                      <p:stCondLst>
-                        <p:cond delay="indefinite"/>
-                      </p:stCondLst>
-                      <p:childTnLst>
-                        <p:par>
-                          <p:cTn id="10" fill="hold">
-                            <p:stCondLst>
-                              <p:cond delay="0"/>
-                            </p:stCondLst>
-                            <p:childTnLst>
                               <p:par>
-                                <p:cTn id="11" presetID="1" presetClass="entr" presetSubtype="0" fill="hold" grpId="1" nodeType="clickEffect">
+                                <p:cTn id="9" presetID="1" presetClass="entr" presetSubtype="0" fill="hold" grpId="1" nodeType="withEffect">
                                   <p:stCondLst>
                                     <p:cond delay="0"/>
                                   </p:stCondLst>
@@ -6947,59 +7000,11 @@
                                   <p:childTnLst>
                                     <p:set>
                                       <p:cBhvr>
-                                        <p:cTn id="12" fill="hold"/>
+                                        <p:cTn id="10" fill="hold"/>
                                         <p:tgtEl>
                                           <p:spTgt spid="144">
                                             <p:txEl>
                                               <p:pRg st="1" end="1"/>
-                                            </p:txEl>
-                                          </p:spTgt>
-                                        </p:tgtEl>
-                                        <p:attrNameLst>
-                                          <p:attrName>style.visibility</p:attrName>
-                                        </p:attrNameLst>
-                                      </p:cBhvr>
-                                      <p:to>
-                                        <p:strVal val="visible"/>
-                                      </p:to>
-                                    </p:set>
-                                  </p:childTnLst>
-                                </p:cTn>
-                              </p:par>
-                            </p:childTnLst>
-                          </p:cTn>
-                        </p:par>
-                      </p:childTnLst>
-                    </p:cTn>
-                  </p:par>
-                  <p:par>
-                    <p:cTn id="13" fill="hold">
-                      <p:stCondLst>
-                        <p:cond delay="indefinite"/>
-                      </p:stCondLst>
-                      <p:childTnLst>
-                        <p:par>
-                          <p:cTn id="14" fill="hold">
-                            <p:stCondLst>
-                              <p:cond delay="0"/>
-                            </p:stCondLst>
-                            <p:childTnLst>
-                              <p:par>
-                                <p:cTn id="15" presetID="1" presetClass="entr" presetSubtype="0" fill="hold" grpId="1" nodeType="clickEffect">
-                                  <p:stCondLst>
-                                    <p:cond delay="0"/>
-                                  </p:stCondLst>
-                                  <p:iterate>
-                                    <p:tmAbs val="0"/>
-                                  </p:iterate>
-                                  <p:childTnLst>
-                                    <p:set>
-                                      <p:cBhvr>
-                                        <p:cTn id="16" fill="hold"/>
-                                        <p:tgtEl>
-                                          <p:spTgt spid="144">
-                                            <p:txEl>
-                                              <p:pRg st="2" end="2"/>
                                             </p:txEl>
                                           </p:spTgt>
                                         </p:tgtEl>
@@ -7187,8 +7192,8 @@
         </p:nvSpPr>
         <p:spPr>
           <a:xfrm>
-            <a:off x="698810" y="4456337"/>
-            <a:ext cx="22986380" cy="5227072"/>
+            <a:off x="698810" y="2028750"/>
+            <a:ext cx="22986380" cy="10082247"/>
           </a:xfrm>
           <a:prstGeom prst="rect">
             <a:avLst/>
@@ -7236,11 +7241,11 @@
               <a:tabLst/>
             </a:pPr>
             <a:r>
-              <a:rPr lang="en-IN" sz="6600" dirty="0"/>
+              <a:rPr lang="en-IN" sz="4400" dirty="0"/>
               <a:t>Cloning</a:t>
             </a:r>
             <a:r>
-              <a:rPr lang="en-IN" sz="6600" b="0" dirty="0"/>
+              <a:rPr lang="en-IN" sz="4400" b="0" dirty="0"/>
               <a:t> a repo on your local machine</a:t>
             </a:r>
           </a:p>
@@ -7262,7 +7267,7 @@
               <a:tabLst/>
             </a:pPr>
             <a:r>
-              <a:rPr kumimoji="0" lang="en-IN" sz="6600" b="0" i="0" u="none" strike="noStrike" cap="none" spc="0" normalizeH="0" baseline="0" dirty="0">
+              <a:rPr kumimoji="0" lang="en-IN" sz="4400" b="0" i="0" u="none" strike="noStrike" cap="none" spc="0" normalizeH="0" baseline="0" dirty="0">
                 <a:ln>
                   <a:noFill/>
                 </a:ln>
@@ -7297,29 +7302,118 @@
               <a:tabLst/>
             </a:pPr>
             <a:r>
-              <a:rPr lang="en-IN" sz="6600" dirty="0"/>
+              <a:rPr lang="en-IN" sz="4400" dirty="0"/>
               <a:t>Stage, commit </a:t>
             </a:r>
             <a:r>
-              <a:rPr lang="en-IN" sz="6600" b="0" dirty="0"/>
+              <a:rPr lang="en-IN" sz="4400" b="0" dirty="0"/>
               <a:t>and </a:t>
             </a:r>
             <a:r>
-              <a:rPr lang="en-IN" sz="6600" dirty="0"/>
+              <a:rPr lang="en-IN" sz="4400" dirty="0"/>
               <a:t>push</a:t>
             </a:r>
             <a:r>
-              <a:rPr lang="en-IN" sz="6600" b="0" dirty="0"/>
+              <a:rPr lang="en-IN" sz="4400" b="0" dirty="0"/>
               <a:t> these changes to your </a:t>
             </a:r>
             <a:r>
-              <a:rPr lang="en-IN" sz="6600" b="0" dirty="0" err="1"/>
+              <a:rPr lang="en-IN" sz="4400" b="0" dirty="0" err="1"/>
               <a:t>Github</a:t>
             </a:r>
             <a:r>
-              <a:rPr lang="en-IN" sz="6600" b="0" dirty="0"/>
+              <a:rPr lang="en-IN" sz="4400" b="0" dirty="0"/>
               <a:t> repo</a:t>
             </a:r>
+          </a:p>
+          <a:p>
+            <a:pPr marL="685800" marR="0" indent="-685800" algn="l" defTabSz="825500" rtl="0" fontAlgn="auto" latinLnBrk="0" hangingPunct="0">
+              <a:lnSpc>
+                <a:spcPct val="100000"/>
+              </a:lnSpc>
+              <a:spcBef>
+                <a:spcPts val="5400"/>
+              </a:spcBef>
+              <a:spcAft>
+                <a:spcPts val="0"/>
+              </a:spcAft>
+              <a:buClrTx/>
+              <a:buSzTx/>
+              <a:buFont typeface="Arial" panose="020B0604020202020204" pitchFamily="34" charset="0"/>
+              <a:buChar char="•"/>
+              <a:tabLst/>
+            </a:pPr>
+            <a:r>
+              <a:rPr lang="en-US" sz="4400" dirty="0"/>
+              <a:t>Commands you should know:</a:t>
+            </a:r>
+            <a:endParaRPr lang="en-US" sz="6600" dirty="0"/>
+          </a:p>
+          <a:p>
+            <a:pPr marL="1600201" lvl="1" indent="-685800">
+              <a:spcBef>
+                <a:spcPts val="2700"/>
+              </a:spcBef>
+              <a:buFont typeface="Arial" panose="020B0604020202020204" pitchFamily="34" charset="0"/>
+              <a:buChar char="•"/>
+            </a:pPr>
+            <a:r>
+              <a:rPr lang="en-US" sz="3600" b="0" dirty="0"/>
+              <a:t>Git clone</a:t>
+            </a:r>
+          </a:p>
+          <a:p>
+            <a:pPr marL="1600201" lvl="1" indent="-685800">
+              <a:spcBef>
+                <a:spcPts val="2700"/>
+              </a:spcBef>
+              <a:buFont typeface="Arial" panose="020B0604020202020204" pitchFamily="34" charset="0"/>
+              <a:buChar char="•"/>
+            </a:pPr>
+            <a:r>
+              <a:rPr lang="en-US" sz="3600" b="0" dirty="0"/>
+              <a:t>Git status (not really needed – but really helpful)</a:t>
+            </a:r>
+          </a:p>
+          <a:p>
+            <a:pPr marL="1600201" lvl="1" indent="-685800">
+              <a:spcBef>
+                <a:spcPts val="2700"/>
+              </a:spcBef>
+              <a:buFont typeface="Arial" panose="020B0604020202020204" pitchFamily="34" charset="0"/>
+              <a:buChar char="•"/>
+            </a:pPr>
+            <a:r>
+              <a:rPr lang="en-US" sz="3600" b="0" dirty="0"/>
+              <a:t>Git add</a:t>
+            </a:r>
+          </a:p>
+          <a:p>
+            <a:pPr marL="1600201" lvl="1" indent="-685800">
+              <a:spcBef>
+                <a:spcPts val="2700"/>
+              </a:spcBef>
+              <a:buFont typeface="Arial" panose="020B0604020202020204" pitchFamily="34" charset="0"/>
+              <a:buChar char="•"/>
+            </a:pPr>
+            <a:r>
+              <a:rPr lang="en-US" sz="3600" b="0" dirty="0"/>
+              <a:t>Git commit</a:t>
+            </a:r>
+          </a:p>
+          <a:p>
+            <a:pPr marL="1600201" lvl="1" indent="-685800">
+              <a:spcBef>
+                <a:spcPts val="2700"/>
+              </a:spcBef>
+              <a:buFont typeface="Arial" panose="020B0604020202020204" pitchFamily="34" charset="0"/>
+              <a:buChar char="•"/>
+            </a:pPr>
+            <a:r>
+              <a:rPr lang="en-US" sz="3600" b="0" dirty="0"/>
+              <a:t>Git push</a:t>
+            </a:r>
+            <a:endParaRPr lang="en-US" b="0" dirty="0"/>
           </a:p>
         </p:txBody>
       </p:sp>

</xml_diff>